<commit_message>
add method for my presentations
</commit_message>
<xml_diff>
--- a/docs/CS Seminar Registration.pptx
+++ b/docs/CS Seminar Registration.pptx
@@ -11,6 +11,13 @@
     <p:sldId id="259" r:id="rId5"/>
     <p:sldId id="258" r:id="rId6"/>
     <p:sldId id="261" r:id="rId7"/>
+    <p:sldId id="262" r:id="rId8"/>
+    <p:sldId id="263" r:id="rId9"/>
+    <p:sldId id="264" r:id="rId10"/>
+    <p:sldId id="265" r:id="rId11"/>
+    <p:sldId id="266" r:id="rId12"/>
+    <p:sldId id="267" r:id="rId13"/>
+    <p:sldId id="268" r:id="rId14"/>
   </p:sldIdLst>
   <p:sldSz cx="12192000" cy="6858000"/>
   <p:notesSz cx="6858000" cy="9144000"/>
@@ -109,6 +116,40 @@
       </a:defRPr>
     </a:lvl9pPr>
   </p:defaultTextStyle>
+  <p:extLst>
+    <p:ext uri="{521415D9-36F7-43E2-AB2F-B90AF26B5E84}">
+      <p14:sectionLst xmlns:p14="http://schemas.microsoft.com/office/powerpoint/2010/main">
+        <p14:section name="Default Section" id="{DC7E8BE1-3CFC-4FBF-8157-F58185C781CA}">
+          <p14:sldIdLst>
+            <p14:sldId id="256"/>
+            <p14:sldId id="257"/>
+            <p14:sldId id="260"/>
+            <p14:sldId id="259"/>
+            <p14:sldId id="258"/>
+            <p14:sldId id="261"/>
+          </p14:sldIdLst>
+        </p14:section>
+        <p14:section name="Demo" id="{57A7B938-D31B-48FC-945B-749F9B4BFBAC}">
+          <p14:sldIdLst>
+            <p14:sldId id="262"/>
+            <p14:sldId id="263"/>
+            <p14:sldId id="264"/>
+            <p14:sldId id="265"/>
+            <p14:sldId id="266"/>
+            <p14:sldId id="267"/>
+          </p14:sldIdLst>
+        </p14:section>
+        <p14:section name="Untitled Section" id="{673173F9-17E2-4266-97C4-345E7BC645D3}">
+          <p14:sldIdLst>
+            <p14:sldId id="268"/>
+          </p14:sldIdLst>
+        </p14:section>
+      </p14:sectionLst>
+    </p:ext>
+    <p:ext uri="{EFAFB233-063F-42B5-8137-9DF3F51BA10A}">
+      <p15:sldGuideLst xmlns:p15="http://schemas.microsoft.com/office/powerpoint/2012/main"/>
+    </p:ext>
+  </p:extLst>
 </p:presentation>
 </file>
 
@@ -3853,6 +3894,317 @@
 </p:sld>
 </file>
 
+<file path=ppt/slides/slide10.xml><?xml version="1.0" encoding="utf-8"?>
+<p:sld xmlns:a="http://schemas.openxmlformats.org/drawingml/2006/main" xmlns:r="http://schemas.openxmlformats.org/officeDocument/2006/relationships" xmlns:p="http://schemas.openxmlformats.org/presentationml/2006/main" show="0">
+  <p:cSld>
+    <p:spTree>
+      <p:nvGrpSpPr>
+        <p:cNvPr id="1" name=""/>
+        <p:cNvGrpSpPr/>
+        <p:nvPr/>
+      </p:nvGrpSpPr>
+      <p:grpSpPr>
+        <a:xfrm>
+          <a:off x="0" y="0"/>
+          <a:ext cx="0" cy="0"/>
+          <a:chOff x="0" y="0"/>
+          <a:chExt cx="0" cy="0"/>
+        </a:xfrm>
+      </p:grpSpPr>
+      <p:sp>
+        <p:nvSpPr>
+          <p:cNvPr id="2" name="Title 1"/>
+          <p:cNvSpPr>
+            <a:spLocks noGrp="1"/>
+          </p:cNvSpPr>
+          <p:nvPr>
+            <p:ph type="title"/>
+          </p:nvPr>
+        </p:nvSpPr>
+        <p:spPr/>
+        <p:txBody>
+          <a:bodyPr/>
+          <a:lstStyle/>
+          <a:p>
+            <a:r>
+              <a:rPr lang="en-US" dirty="0" err="1"/>
+              <a:t>Präsentation</a:t>
+            </a:r>
+            <a:r>
+              <a:rPr lang="en-US" dirty="0"/>
+              <a:t> </a:t>
+            </a:r>
+            <a:r>
+              <a:rPr lang="en-US" dirty="0" err="1"/>
+              <a:t>erstellen</a:t>
+            </a:r>
+            <a:endParaRPr lang="en-US" dirty="0"/>
+          </a:p>
+        </p:txBody>
+      </p:sp>
+      <p:pic>
+        <p:nvPicPr>
+          <p:cNvPr id="4" name="Content Placeholder 3"/>
+          <p:cNvPicPr>
+            <a:picLocks noGrp="1" noChangeAspect="1"/>
+          </p:cNvPicPr>
+          <p:nvPr>
+            <p:ph idx="1"/>
+          </p:nvPr>
+        </p:nvPicPr>
+        <p:blipFill>
+          <a:blip r:embed="rId2"/>
+          <a:stretch>
+            <a:fillRect/>
+          </a:stretch>
+        </p:blipFill>
+        <p:spPr>
+          <a:xfrm>
+            <a:off x="2568118" y="1735392"/>
+            <a:ext cx="7500114" cy="4975139"/>
+          </a:xfrm>
+        </p:spPr>
+      </p:pic>
+    </p:spTree>
+    <p:extLst>
+      <p:ext uri="{BB962C8B-B14F-4D97-AF65-F5344CB8AC3E}">
+        <p14:creationId xmlns:p14="http://schemas.microsoft.com/office/powerpoint/2010/main" val="445582858"/>
+      </p:ext>
+    </p:extLst>
+  </p:cSld>
+  <p:clrMapOvr>
+    <a:masterClrMapping/>
+  </p:clrMapOvr>
+</p:sld>
+</file>
+
+<file path=ppt/slides/slide11.xml><?xml version="1.0" encoding="utf-8"?>
+<p:sld xmlns:a="http://schemas.openxmlformats.org/drawingml/2006/main" xmlns:r="http://schemas.openxmlformats.org/officeDocument/2006/relationships" xmlns:p="http://schemas.openxmlformats.org/presentationml/2006/main" show="0">
+  <p:cSld>
+    <p:spTree>
+      <p:nvGrpSpPr>
+        <p:cNvPr id="1" name=""/>
+        <p:cNvGrpSpPr/>
+        <p:nvPr/>
+      </p:nvGrpSpPr>
+      <p:grpSpPr>
+        <a:xfrm>
+          <a:off x="0" y="0"/>
+          <a:ext cx="0" cy="0"/>
+          <a:chOff x="0" y="0"/>
+          <a:chExt cx="0" cy="0"/>
+        </a:xfrm>
+      </p:grpSpPr>
+      <p:sp>
+        <p:nvSpPr>
+          <p:cNvPr id="2" name="Title 1"/>
+          <p:cNvSpPr>
+            <a:spLocks noGrp="1"/>
+          </p:cNvSpPr>
+          <p:nvPr>
+            <p:ph type="title"/>
+          </p:nvPr>
+        </p:nvSpPr>
+        <p:spPr/>
+        <p:txBody>
+          <a:bodyPr/>
+          <a:lstStyle/>
+          <a:p>
+            <a:r>
+              <a:rPr lang="en-US" dirty="0" err="1"/>
+              <a:t>Übersicht</a:t>
+            </a:r>
+            <a:endParaRPr lang="en-US" dirty="0"/>
+          </a:p>
+        </p:txBody>
+      </p:sp>
+      <p:pic>
+        <p:nvPicPr>
+          <p:cNvPr id="4" name="Content Placeholder 3"/>
+          <p:cNvPicPr>
+            <a:picLocks noGrp="1" noChangeAspect="1"/>
+          </p:cNvPicPr>
+          <p:nvPr>
+            <p:ph idx="1"/>
+          </p:nvPr>
+        </p:nvPicPr>
+        <p:blipFill>
+          <a:blip r:embed="rId2"/>
+          <a:stretch>
+            <a:fillRect/>
+          </a:stretch>
+        </p:blipFill>
+        <p:spPr>
+          <a:xfrm>
+            <a:off x="1934448" y="2286000"/>
+            <a:ext cx="8475503" cy="3581400"/>
+          </a:xfrm>
+        </p:spPr>
+      </p:pic>
+    </p:spTree>
+    <p:extLst>
+      <p:ext uri="{BB962C8B-B14F-4D97-AF65-F5344CB8AC3E}">
+        <p14:creationId xmlns:p14="http://schemas.microsoft.com/office/powerpoint/2010/main" val="925398240"/>
+      </p:ext>
+    </p:extLst>
+  </p:cSld>
+  <p:clrMapOvr>
+    <a:masterClrMapping/>
+  </p:clrMapOvr>
+</p:sld>
+</file>
+
+<file path=ppt/slides/slide12.xml><?xml version="1.0" encoding="utf-8"?>
+<p:sld xmlns:a="http://schemas.openxmlformats.org/drawingml/2006/main" xmlns:r="http://schemas.openxmlformats.org/officeDocument/2006/relationships" xmlns:p="http://schemas.openxmlformats.org/presentationml/2006/main" show="0">
+  <p:cSld>
+    <p:spTree>
+      <p:nvGrpSpPr>
+        <p:cNvPr id="1" name=""/>
+        <p:cNvGrpSpPr/>
+        <p:nvPr/>
+      </p:nvGrpSpPr>
+      <p:grpSpPr>
+        <a:xfrm>
+          <a:off x="0" y="0"/>
+          <a:ext cx="0" cy="0"/>
+          <a:chOff x="0" y="0"/>
+          <a:chExt cx="0" cy="0"/>
+        </a:xfrm>
+      </p:grpSpPr>
+      <p:sp>
+        <p:nvSpPr>
+          <p:cNvPr id="2" name="Title 1"/>
+          <p:cNvSpPr>
+            <a:spLocks noGrp="1"/>
+          </p:cNvSpPr>
+          <p:nvPr>
+            <p:ph type="title"/>
+          </p:nvPr>
+        </p:nvSpPr>
+        <p:spPr/>
+        <p:txBody>
+          <a:bodyPr/>
+          <a:lstStyle/>
+          <a:p>
+            <a:r>
+              <a:rPr lang="en-US" dirty="0" err="1"/>
+              <a:t>Passwort</a:t>
+            </a:r>
+            <a:r>
+              <a:rPr lang="en-US" dirty="0"/>
+              <a:t> Reset</a:t>
+            </a:r>
+          </a:p>
+        </p:txBody>
+      </p:sp>
+      <p:pic>
+        <p:nvPicPr>
+          <p:cNvPr id="4" name="Content Placeholder 3"/>
+          <p:cNvPicPr>
+            <a:picLocks noGrp="1" noChangeAspect="1"/>
+          </p:cNvPicPr>
+          <p:nvPr>
+            <p:ph idx="1"/>
+          </p:nvPr>
+        </p:nvPicPr>
+        <p:blipFill>
+          <a:blip r:embed="rId2"/>
+          <a:stretch>
+            <a:fillRect/>
+          </a:stretch>
+        </p:blipFill>
+        <p:spPr>
+          <a:xfrm>
+            <a:off x="1371600" y="1913285"/>
+            <a:ext cx="10489928" cy="4138469"/>
+          </a:xfrm>
+        </p:spPr>
+      </p:pic>
+    </p:spTree>
+    <p:extLst>
+      <p:ext uri="{BB962C8B-B14F-4D97-AF65-F5344CB8AC3E}">
+        <p14:creationId xmlns:p14="http://schemas.microsoft.com/office/powerpoint/2010/main" val="1976842432"/>
+      </p:ext>
+    </p:extLst>
+  </p:cSld>
+  <p:clrMapOvr>
+    <a:masterClrMapping/>
+  </p:clrMapOvr>
+</p:sld>
+</file>
+
+<file path=ppt/slides/slide13.xml><?xml version="1.0" encoding="utf-8"?>
+<p:sld xmlns:a="http://schemas.openxmlformats.org/drawingml/2006/main" xmlns:r="http://schemas.openxmlformats.org/officeDocument/2006/relationships" xmlns:p="http://schemas.openxmlformats.org/presentationml/2006/main">
+  <p:cSld>
+    <p:spTree>
+      <p:nvGrpSpPr>
+        <p:cNvPr id="1" name=""/>
+        <p:cNvGrpSpPr/>
+        <p:nvPr/>
+      </p:nvGrpSpPr>
+      <p:grpSpPr>
+        <a:xfrm>
+          <a:off x="0" y="0"/>
+          <a:ext cx="0" cy="0"/>
+          <a:chOff x="0" y="0"/>
+          <a:chExt cx="0" cy="0"/>
+        </a:xfrm>
+      </p:grpSpPr>
+      <p:sp>
+        <p:nvSpPr>
+          <p:cNvPr id="2" name="Title 1"/>
+          <p:cNvSpPr>
+            <a:spLocks noGrp="1"/>
+          </p:cNvSpPr>
+          <p:nvPr>
+            <p:ph type="title"/>
+          </p:nvPr>
+        </p:nvSpPr>
+        <p:spPr/>
+        <p:txBody>
+          <a:bodyPr/>
+          <a:lstStyle/>
+          <a:p>
+            <a:r>
+              <a:rPr lang="en-US" dirty="0" err="1"/>
+              <a:t>Fragen</a:t>
+            </a:r>
+            <a:endParaRPr lang="en-US" dirty="0"/>
+          </a:p>
+        </p:txBody>
+      </p:sp>
+      <p:sp>
+        <p:nvSpPr>
+          <p:cNvPr id="3" name="Content Placeholder 2"/>
+          <p:cNvSpPr>
+            <a:spLocks noGrp="1"/>
+          </p:cNvSpPr>
+          <p:nvPr>
+            <p:ph idx="1"/>
+          </p:nvPr>
+        </p:nvSpPr>
+        <p:spPr/>
+        <p:txBody>
+          <a:bodyPr/>
+          <a:lstStyle/>
+          <a:p>
+            <a:endParaRPr lang="en-US"/>
+          </a:p>
+        </p:txBody>
+      </p:sp>
+    </p:spTree>
+    <p:extLst>
+      <p:ext uri="{BB962C8B-B14F-4D97-AF65-F5344CB8AC3E}">
+        <p14:creationId xmlns:p14="http://schemas.microsoft.com/office/powerpoint/2010/main" val="2452784098"/>
+      </p:ext>
+    </p:extLst>
+  </p:cSld>
+  <p:clrMapOvr>
+    <a:masterClrMapping/>
+  </p:clrMapOvr>
+</p:sld>
+</file>
+
 <file path=ppt/slides/slide2.xml><?xml version="1.0" encoding="utf-8"?>
 <p:sld xmlns:a="http://schemas.openxmlformats.org/drawingml/2006/main" xmlns:r="http://schemas.openxmlformats.org/officeDocument/2006/relationships" xmlns:p="http://schemas.openxmlformats.org/presentationml/2006/main">
   <p:cSld>
@@ -4024,6 +4376,16 @@
               <a:t>React I18n</a:t>
             </a:r>
           </a:p>
+          <a:p>
+            <a:r>
+              <a:rPr lang="en-US" dirty="0" err="1"/>
+              <a:t>MySql</a:t>
+            </a:r>
+            <a:r>
+              <a:rPr lang="en-US" dirty="0"/>
+              <a:t> / Maria DB</a:t>
+            </a:r>
+          </a:p>
         </p:txBody>
       </p:sp>
     </p:spTree>
@@ -4273,6 +4635,34 @@
               <a:t>Argon2</a:t>
             </a:r>
           </a:p>
+          <a:p>
+            <a:r>
+              <a:rPr lang="en-US" dirty="0"/>
+              <a:t>Tokens </a:t>
+            </a:r>
+            <a:r>
+              <a:rPr lang="en-US" dirty="0" err="1"/>
+              <a:t>im</a:t>
+            </a:r>
+            <a:r>
+              <a:rPr lang="en-US" dirty="0"/>
+              <a:t> Hash (#token=…)</a:t>
+            </a:r>
+          </a:p>
+          <a:p>
+            <a:r>
+              <a:rPr lang="en-US" dirty="0"/>
+              <a:t>Temp Tokens </a:t>
+            </a:r>
+            <a:r>
+              <a:rPr lang="en-US" dirty="0" err="1"/>
+              <a:t>für</a:t>
+            </a:r>
+            <a:r>
+              <a:rPr lang="en-US" dirty="0"/>
+              <a:t> Files</a:t>
+            </a:r>
+          </a:p>
         </p:txBody>
       </p:sp>
     </p:spTree>
@@ -4354,15 +4744,31 @@
           <a:p>
             <a:r>
               <a:rPr lang="en-US" dirty="0"/>
-              <a:t>File Download </a:t>
-            </a:r>
-            <a:r>
-              <a:rPr lang="en-US" dirty="0">
-                <a:sym typeface="Wingdings" panose="05000000000000000000" pitchFamily="2" charset="2"/>
-              </a:rPr>
-              <a:t></a:t>
-            </a:r>
-            <a:endParaRPr lang="en-US" dirty="0"/>
+              <a:t>Testing </a:t>
+            </a:r>
+            <a:r>
+              <a:rPr lang="en-US" dirty="0" err="1"/>
+              <a:t>für</a:t>
+            </a:r>
+            <a:r>
+              <a:rPr lang="en-US" dirty="0"/>
+              <a:t> </a:t>
+            </a:r>
+            <a:r>
+              <a:rPr lang="en-US" dirty="0" err="1"/>
+              <a:t>Fehler</a:t>
+            </a:r>
+            <a:endParaRPr lang="en-US" dirty="0"/>
+          </a:p>
+          <a:p>
+            <a:r>
+              <a:rPr lang="en-US" dirty="0" err="1"/>
+              <a:t>Besseres</a:t>
+            </a:r>
+            <a:r>
+              <a:rPr lang="en-US" dirty="0"/>
+              <a:t> Logging</a:t>
+            </a:r>
           </a:p>
         </p:txBody>
       </p:sp>
@@ -4370,6 +4776,242 @@
     <p:extLst>
       <p:ext uri="{BB962C8B-B14F-4D97-AF65-F5344CB8AC3E}">
         <p14:creationId xmlns:p14="http://schemas.microsoft.com/office/powerpoint/2010/main" val="1988315661"/>
+      </p:ext>
+    </p:extLst>
+  </p:cSld>
+  <p:clrMapOvr>
+    <a:masterClrMapping/>
+  </p:clrMapOvr>
+</p:sld>
+</file>
+
+<file path=ppt/slides/slide7.xml><?xml version="1.0" encoding="utf-8"?>
+<p:sld xmlns:a="http://schemas.openxmlformats.org/drawingml/2006/main" xmlns:r="http://schemas.openxmlformats.org/officeDocument/2006/relationships" xmlns:p="http://schemas.openxmlformats.org/presentationml/2006/main">
+  <p:cSld>
+    <p:spTree>
+      <p:nvGrpSpPr>
+        <p:cNvPr id="1" name=""/>
+        <p:cNvGrpSpPr/>
+        <p:nvPr/>
+      </p:nvGrpSpPr>
+      <p:grpSpPr>
+        <a:xfrm>
+          <a:off x="0" y="0"/>
+          <a:ext cx="0" cy="0"/>
+          <a:chOff x="0" y="0"/>
+          <a:chExt cx="0" cy="0"/>
+        </a:xfrm>
+      </p:grpSpPr>
+      <p:sp>
+        <p:nvSpPr>
+          <p:cNvPr id="2" name="Title 1"/>
+          <p:cNvSpPr>
+            <a:spLocks noGrp="1"/>
+          </p:cNvSpPr>
+          <p:nvPr>
+            <p:ph type="title"/>
+          </p:nvPr>
+        </p:nvSpPr>
+        <p:spPr/>
+        <p:txBody>
+          <a:bodyPr/>
+          <a:lstStyle/>
+          <a:p>
+            <a:r>
+              <a:rPr lang="en-US" dirty="0"/>
+              <a:t>Demo</a:t>
+            </a:r>
+          </a:p>
+        </p:txBody>
+      </p:sp>
+      <p:sp>
+        <p:nvSpPr>
+          <p:cNvPr id="3" name="Content Placeholder 2"/>
+          <p:cNvSpPr>
+            <a:spLocks noGrp="1"/>
+          </p:cNvSpPr>
+          <p:nvPr>
+            <p:ph idx="1"/>
+          </p:nvPr>
+        </p:nvSpPr>
+        <p:spPr/>
+        <p:txBody>
+          <a:bodyPr/>
+          <a:lstStyle/>
+          <a:p>
+            <a:r>
+              <a:rPr lang="en-US" dirty="0">
+                <a:hlinkClick r:id="rId2"/>
+              </a:rPr>
+              <a:t>https://www.cs.technik.fhnw.ch/wodss17-6/index.html</a:t>
+            </a:r>
+            <a:r>
+              <a:rPr lang="en-US" dirty="0"/>
+              <a:t> </a:t>
+            </a:r>
+            <a:endParaRPr lang="en-US" dirty="0"/>
+          </a:p>
+        </p:txBody>
+      </p:sp>
+    </p:spTree>
+    <p:extLst>
+      <p:ext uri="{BB962C8B-B14F-4D97-AF65-F5344CB8AC3E}">
+        <p14:creationId xmlns:p14="http://schemas.microsoft.com/office/powerpoint/2010/main" val="625221645"/>
+      </p:ext>
+    </p:extLst>
+  </p:cSld>
+  <p:clrMapOvr>
+    <a:masterClrMapping/>
+  </p:clrMapOvr>
+</p:sld>
+</file>
+
+<file path=ppt/slides/slide8.xml><?xml version="1.0" encoding="utf-8"?>
+<p:sld xmlns:a="http://schemas.openxmlformats.org/drawingml/2006/main" xmlns:r="http://schemas.openxmlformats.org/officeDocument/2006/relationships" xmlns:p="http://schemas.openxmlformats.org/presentationml/2006/main" show="0">
+  <p:cSld>
+    <p:spTree>
+      <p:nvGrpSpPr>
+        <p:cNvPr id="1" name=""/>
+        <p:cNvGrpSpPr/>
+        <p:nvPr/>
+      </p:nvGrpSpPr>
+      <p:grpSpPr>
+        <a:xfrm>
+          <a:off x="0" y="0"/>
+          <a:ext cx="0" cy="0"/>
+          <a:chOff x="0" y="0"/>
+          <a:chExt cx="0" cy="0"/>
+        </a:xfrm>
+      </p:grpSpPr>
+      <p:sp>
+        <p:nvSpPr>
+          <p:cNvPr id="2" name="Title 1"/>
+          <p:cNvSpPr>
+            <a:spLocks noGrp="1"/>
+          </p:cNvSpPr>
+          <p:nvPr>
+            <p:ph type="title"/>
+          </p:nvPr>
+        </p:nvSpPr>
+        <p:spPr/>
+        <p:txBody>
+          <a:bodyPr/>
+          <a:lstStyle/>
+          <a:p>
+            <a:r>
+              <a:rPr lang="en-US" dirty="0"/>
+              <a:t>Log in</a:t>
+            </a:r>
+          </a:p>
+        </p:txBody>
+      </p:sp>
+      <p:pic>
+        <p:nvPicPr>
+          <p:cNvPr id="4" name="Content Placeholder 3"/>
+          <p:cNvPicPr>
+            <a:picLocks noGrp="1" noChangeAspect="1"/>
+          </p:cNvPicPr>
+          <p:nvPr>
+            <p:ph idx="1"/>
+          </p:nvPr>
+        </p:nvPicPr>
+        <p:blipFill>
+          <a:blip r:embed="rId2"/>
+          <a:stretch>
+            <a:fillRect/>
+          </a:stretch>
+        </p:blipFill>
+        <p:spPr>
+          <a:xfrm>
+            <a:off x="1145740" y="2171700"/>
+            <a:ext cx="10955436" cy="4402394"/>
+          </a:xfrm>
+        </p:spPr>
+      </p:pic>
+    </p:spTree>
+    <p:extLst>
+      <p:ext uri="{BB962C8B-B14F-4D97-AF65-F5344CB8AC3E}">
+        <p14:creationId xmlns:p14="http://schemas.microsoft.com/office/powerpoint/2010/main" val="717621399"/>
+      </p:ext>
+    </p:extLst>
+  </p:cSld>
+  <p:clrMapOvr>
+    <a:masterClrMapping/>
+  </p:clrMapOvr>
+</p:sld>
+</file>
+
+<file path=ppt/slides/slide9.xml><?xml version="1.0" encoding="utf-8"?>
+<p:sld xmlns:a="http://schemas.openxmlformats.org/drawingml/2006/main" xmlns:r="http://schemas.openxmlformats.org/officeDocument/2006/relationships" xmlns:p="http://schemas.openxmlformats.org/presentationml/2006/main" show="0">
+  <p:cSld>
+    <p:spTree>
+      <p:nvGrpSpPr>
+        <p:cNvPr id="1" name=""/>
+        <p:cNvGrpSpPr/>
+        <p:nvPr/>
+      </p:nvGrpSpPr>
+      <p:grpSpPr>
+        <a:xfrm>
+          <a:off x="0" y="0"/>
+          <a:ext cx="0" cy="0"/>
+          <a:chOff x="0" y="0"/>
+          <a:chExt cx="0" cy="0"/>
+        </a:xfrm>
+      </p:grpSpPr>
+      <p:sp>
+        <p:nvSpPr>
+          <p:cNvPr id="2" name="Title 1"/>
+          <p:cNvSpPr>
+            <a:spLocks noGrp="1"/>
+          </p:cNvSpPr>
+          <p:nvPr>
+            <p:ph type="title"/>
+          </p:nvPr>
+        </p:nvSpPr>
+        <p:spPr/>
+        <p:txBody>
+          <a:bodyPr/>
+          <a:lstStyle/>
+          <a:p>
+            <a:r>
+              <a:rPr lang="en-US" dirty="0"/>
+              <a:t>User </a:t>
+            </a:r>
+            <a:r>
+              <a:rPr lang="en-US" dirty="0" err="1"/>
+              <a:t>erstellen</a:t>
+            </a:r>
+            <a:endParaRPr lang="en-US" dirty="0"/>
+          </a:p>
+        </p:txBody>
+      </p:sp>
+      <p:pic>
+        <p:nvPicPr>
+          <p:cNvPr id="4" name="Content Placeholder 3"/>
+          <p:cNvPicPr>
+            <a:picLocks noGrp="1" noChangeAspect="1"/>
+          </p:cNvPicPr>
+          <p:nvPr>
+            <p:ph idx="1"/>
+          </p:nvPr>
+        </p:nvPicPr>
+        <p:blipFill>
+          <a:blip r:embed="rId2"/>
+          <a:stretch>
+            <a:fillRect/>
+          </a:stretch>
+        </p:blipFill>
+        <p:spPr>
+          <a:xfrm>
+            <a:off x="1716011" y="2286000"/>
+            <a:ext cx="8912378" cy="3581400"/>
+          </a:xfrm>
+        </p:spPr>
+      </p:pic>
+    </p:spTree>
+    <p:extLst>
+      <p:ext uri="{BB962C8B-B14F-4D97-AF65-F5344CB8AC3E}">
+        <p14:creationId xmlns:p14="http://schemas.microsoft.com/office/powerpoint/2010/main" val="41095348"/>
       </p:ext>
     </p:extLst>
   </p:cSld>

</xml_diff>